<commit_message>
Updates copyright, headers, and output
Signed-off-by: Franklin Webber <franklin@chef.io>
</commit_message>
<xml_diff>
--- a/01-introduction.pptx
+++ b/01-introduction.pptx
@@ -2932,14 +2932,14 @@
           </a:ln>
           <a:extLst>
             <a:ext uri="{909E8E84-426E-40dd-AFC4-6F175D3DCCD1}">
-              <a14:hiddenFill xmlns:a14="http://schemas.microsoft.com/office/drawing/2010/main" xmlns="">
+              <a14:hiddenFill xmlns="" xmlns:a14="http://schemas.microsoft.com/office/drawing/2010/main">
                 <a:solidFill>
                   <a:srgbClr val="FFFFFF"/>
                 </a:solidFill>
               </a14:hiddenFill>
             </a:ext>
             <a:ext uri="{91240B29-F687-4f45-9708-019B960494DF}">
-              <a14:hiddenLine xmlns:a14="http://schemas.microsoft.com/office/drawing/2010/main" xmlns="" w="9525">
+              <a14:hiddenLine xmlns="" xmlns:a14="http://schemas.microsoft.com/office/drawing/2010/main" w="9525">
                 <a:solidFill>
                   <a:srgbClr val="000000"/>
                 </a:solidFill>
@@ -3087,14 +3087,14 @@
           </a:ln>
           <a:extLst>
             <a:ext uri="{909E8E84-426E-40dd-AFC4-6F175D3DCCD1}">
-              <a14:hiddenFill xmlns:a14="http://schemas.microsoft.com/office/drawing/2010/main" xmlns="">
+              <a14:hiddenFill xmlns="" xmlns:a14="http://schemas.microsoft.com/office/drawing/2010/main">
                 <a:solidFill>
                   <a:srgbClr val="FFFFFF"/>
                 </a:solidFill>
               </a14:hiddenFill>
             </a:ext>
             <a:ext uri="{91240B29-F687-4f45-9708-019B960494DF}">
-              <a14:hiddenLine xmlns:a14="http://schemas.microsoft.com/office/drawing/2010/main" xmlns="" w="9525">
+              <a14:hiddenLine xmlns="" xmlns:a14="http://schemas.microsoft.com/office/drawing/2010/main" w="9525">
                 <a:solidFill>
                   <a:srgbClr val="000000"/>
                 </a:solidFill>
@@ -3585,14 +3585,14 @@
           </a:ln>
           <a:extLst>
             <a:ext uri="{909E8E84-426E-40dd-AFC4-6F175D3DCCD1}">
-              <a14:hiddenFill xmlns:a14="http://schemas.microsoft.com/office/drawing/2010/main" xmlns="">
+              <a14:hiddenFill xmlns="" xmlns:a14="http://schemas.microsoft.com/office/drawing/2010/main">
                 <a:solidFill>
                   <a:srgbClr val="FFFFFF"/>
                 </a:solidFill>
               </a14:hiddenFill>
             </a:ext>
             <a:ext uri="{91240B29-F687-4f45-9708-019B960494DF}">
-              <a14:hiddenLine xmlns:a14="http://schemas.microsoft.com/office/drawing/2010/main" xmlns="" w="9525">
+              <a14:hiddenLine xmlns="" xmlns:a14="http://schemas.microsoft.com/office/drawing/2010/main" w="9525">
                 <a:solidFill>
                   <a:srgbClr val="000000"/>
                 </a:solidFill>
@@ -5019,14 +5019,14 @@
           </a:ln>
           <a:extLst>
             <a:ext uri="{909E8E84-426E-40dd-AFC4-6F175D3DCCD1}">
-              <a14:hiddenFill xmlns:a14="http://schemas.microsoft.com/office/drawing/2010/main" xmlns="">
+              <a14:hiddenFill xmlns="" xmlns:a14="http://schemas.microsoft.com/office/drawing/2010/main">
                 <a:solidFill>
                   <a:srgbClr val="FFFFFF"/>
                 </a:solidFill>
               </a14:hiddenFill>
             </a:ext>
             <a:ext uri="{91240B29-F687-4f45-9708-019B960494DF}">
-              <a14:hiddenLine xmlns:a14="http://schemas.microsoft.com/office/drawing/2010/main" xmlns="" w="9525">
+              <a14:hiddenLine xmlns="" xmlns:a14="http://schemas.microsoft.com/office/drawing/2010/main" w="9525">
                 <a:solidFill>
                   <a:srgbClr val="000000"/>
                 </a:solidFill>
@@ -6390,14 +6390,14 @@
           </a:ln>
           <a:extLst>
             <a:ext uri="{909E8E84-426E-40dd-AFC4-6F175D3DCCD1}">
-              <a14:hiddenFill xmlns:a14="http://schemas.microsoft.com/office/drawing/2010/main" xmlns="">
+              <a14:hiddenFill xmlns="" xmlns:a14="http://schemas.microsoft.com/office/drawing/2010/main">
                 <a:solidFill>
                   <a:srgbClr val="FFFFFF"/>
                 </a:solidFill>
               </a14:hiddenFill>
             </a:ext>
             <a:ext uri="{91240B29-F687-4f45-9708-019B960494DF}">
-              <a14:hiddenLine xmlns:a14="http://schemas.microsoft.com/office/drawing/2010/main" xmlns="" w="9525">
+              <a14:hiddenLine xmlns="" xmlns:a14="http://schemas.microsoft.com/office/drawing/2010/main" w="9525">
                 <a:solidFill>
                   <a:srgbClr val="000000"/>
                 </a:solidFill>
@@ -6955,14 +6955,14 @@
           </a:ln>
           <a:extLst>
             <a:ext uri="{909E8E84-426E-40dd-AFC4-6F175D3DCCD1}">
-              <a14:hiddenFill xmlns:a14="http://schemas.microsoft.com/office/drawing/2010/main" xmlns="">
+              <a14:hiddenFill xmlns="" xmlns:a14="http://schemas.microsoft.com/office/drawing/2010/main">
                 <a:solidFill>
                   <a:srgbClr val="FFFFFF"/>
                 </a:solidFill>
               </a14:hiddenFill>
             </a:ext>
             <a:ext uri="{91240B29-F687-4f45-9708-019B960494DF}">
-              <a14:hiddenLine xmlns:a14="http://schemas.microsoft.com/office/drawing/2010/main" xmlns="" w="9525">
+              <a14:hiddenLine xmlns="" xmlns:a14="http://schemas.microsoft.com/office/drawing/2010/main" w="9525">
                 <a:solidFill>
                   <a:srgbClr val="000000"/>
                 </a:solidFill>
@@ -7529,14 +7529,14 @@
           </a:ln>
           <a:extLst>
             <a:ext uri="{909E8E84-426E-40dd-AFC4-6F175D3DCCD1}">
-              <a14:hiddenFill xmlns:a14="http://schemas.microsoft.com/office/drawing/2010/main" xmlns="">
+              <a14:hiddenFill xmlns="" xmlns:a14="http://schemas.microsoft.com/office/drawing/2010/main">
                 <a:solidFill>
                   <a:srgbClr val="FFFFFF"/>
                 </a:solidFill>
               </a14:hiddenFill>
             </a:ext>
             <a:ext uri="{91240B29-F687-4f45-9708-019B960494DF}">
-              <a14:hiddenLine xmlns:a14="http://schemas.microsoft.com/office/drawing/2010/main" xmlns="" w="9525">
+              <a14:hiddenLine xmlns="" xmlns:a14="http://schemas.microsoft.com/office/drawing/2010/main" w="9525">
                 <a:solidFill>
                   <a:srgbClr val="000000"/>
                 </a:solidFill>
@@ -8476,14 +8476,14 @@
           </a:ln>
           <a:extLst>
             <a:ext uri="{909E8E84-426E-40dd-AFC4-6F175D3DCCD1}">
-              <a14:hiddenFill xmlns:a14="http://schemas.microsoft.com/office/drawing/2010/main" xmlns="">
+              <a14:hiddenFill xmlns="" xmlns:a14="http://schemas.microsoft.com/office/drawing/2010/main">
                 <a:solidFill>
                   <a:srgbClr val="FFFFFF"/>
                 </a:solidFill>
               </a14:hiddenFill>
             </a:ext>
             <a:ext uri="{91240B29-F687-4f45-9708-019B960494DF}">
-              <a14:hiddenLine xmlns:a14="http://schemas.microsoft.com/office/drawing/2010/main" xmlns="" w="9525">
+              <a14:hiddenLine xmlns="" xmlns:a14="http://schemas.microsoft.com/office/drawing/2010/main" w="9525">
                 <a:solidFill>
                   <a:srgbClr val="000000"/>
                 </a:solidFill>
@@ -8582,7 +8582,7 @@
                 <a:ea typeface="+mn-ea"/>
                 <a:cs typeface="+mn-cs"/>
               </a:rPr>
-              <a:t>2017</a:t>
+              <a:t>2018</a:t>
             </a:r>
             <a:r>
               <a:rPr lang="en-US" dirty="0">
@@ -9238,14 +9238,14 @@
           </a:ln>
           <a:extLst>
             <a:ext uri="{909E8E84-426E-40dd-AFC4-6F175D3DCCD1}">
-              <a14:hiddenFill xmlns:a14="http://schemas.microsoft.com/office/drawing/2010/main" xmlns="">
+              <a14:hiddenFill xmlns="" xmlns:a14="http://schemas.microsoft.com/office/drawing/2010/main">
                 <a:solidFill>
                   <a:srgbClr val="FFFFFF"/>
                 </a:solidFill>
               </a14:hiddenFill>
             </a:ext>
             <a:ext uri="{91240B29-F687-4f45-9708-019B960494DF}">
-              <a14:hiddenLine xmlns:a14="http://schemas.microsoft.com/office/drawing/2010/main" xmlns="" w="9525">
+              <a14:hiddenLine xmlns="" xmlns:a14="http://schemas.microsoft.com/office/drawing/2010/main" w="9525">
                 <a:solidFill>
                   <a:srgbClr val="000000"/>
                 </a:solidFill>
@@ -9344,7 +9344,7 @@
                 <a:ea typeface="+mn-ea"/>
                 <a:cs typeface="+mn-cs"/>
               </a:rPr>
-              <a:t>2017</a:t>
+              <a:t>2018</a:t>
             </a:r>
             <a:r>
               <a:rPr lang="en-US" dirty="0">
@@ -12798,61 +12798,18 @@
 </file>
 
 <file path=customXml/item1.xml><?xml version="1.0" encoding="utf-8"?>
-<?mso-contentType ?>
-<FormTemplates xmlns="http://schemas.microsoft.com/sharepoint/v3/contenttype/forms">
-  <Display>DocumentLibraryForm</Display>
-  <Edit>DocumentLibraryForm</Edit>
-  <New>DocumentLibraryForm</New>
-</FormTemplates>
+<p:properties xmlns:p="http://schemas.microsoft.com/office/2006/metadata/properties" xmlns:xsi="http://www.w3.org/2001/XMLSchema-instance" xmlns:pc="http://schemas.microsoft.com/office/infopath/2007/PartnerControls">
+  <documentManagement>
+    <_dlc_DocId xmlns="7bb5d761-a2ea-4873-95f7-7a6658fb3ef0">M4CWTKMW727E-592-73</_dlc_DocId>
+    <_dlc_DocIdUrl xmlns="7bb5d761-a2ea-4873-95f7-7a6658fb3ef0">
+      <Url>https://kms.vci.local/marketing/team/_layouts/DocIdRedir.aspx?ID=M4CWTKMW727E-592-73</Url>
+      <Description>M4CWTKMW727E-592-73</Description>
+    </_dlc_DocIdUrl>
+  </documentManagement>
+</p:properties>
 </file>
 
 <file path=customXml/item2.xml><?xml version="1.0" encoding="utf-8"?>
-<?mso-contentType ?>
-<spe:Receivers xmlns:spe="http://schemas.microsoft.com/sharepoint/events">
-  <Receiver>
-    <Name>Document ID Generator</Name>
-    <Synchronization>Synchronous</Synchronization>
-    <Type>10001</Type>
-    <SequenceNumber>1000</SequenceNumber>
-    <Assembly>Microsoft.Office.DocumentManagement, Version=14.0.0.0, Culture=neutral, PublicKeyToken=71e9bce111e9429c</Assembly>
-    <Class>Microsoft.Office.DocumentManagement.Internal.DocIdHandler</Class>
-    <Data/>
-    <Filter/>
-  </Receiver>
-  <Receiver>
-    <Name>Document ID Generator</Name>
-    <Synchronization>Synchronous</Synchronization>
-    <Type>10002</Type>
-    <SequenceNumber>1001</SequenceNumber>
-    <Assembly>Microsoft.Office.DocumentManagement, Version=14.0.0.0, Culture=neutral, PublicKeyToken=71e9bce111e9429c</Assembly>
-    <Class>Microsoft.Office.DocumentManagement.Internal.DocIdHandler</Class>
-    <Data/>
-    <Filter/>
-  </Receiver>
-  <Receiver>
-    <Name>Document ID Generator</Name>
-    <Synchronization>Synchronous</Synchronization>
-    <Type>10004</Type>
-    <SequenceNumber>1002</SequenceNumber>
-    <Assembly>Microsoft.Office.DocumentManagement, Version=14.0.0.0, Culture=neutral, PublicKeyToken=71e9bce111e9429c</Assembly>
-    <Class>Microsoft.Office.DocumentManagement.Internal.DocIdHandler</Class>
-    <Data/>
-    <Filter/>
-  </Receiver>
-  <Receiver>
-    <Name>Document ID Generator</Name>
-    <Synchronization>Synchronous</Synchronization>
-    <Type>10006</Type>
-    <SequenceNumber>1003</SequenceNumber>
-    <Assembly>Microsoft.Office.DocumentManagement, Version=14.0.0.0, Culture=neutral, PublicKeyToken=71e9bce111e9429c</Assembly>
-    <Class>Microsoft.Office.DocumentManagement.Internal.DocIdHandler</Class>
-    <Data/>
-    <Filter/>
-  </Receiver>
-</spe:Receivers>
-</file>
-
-<file path=customXml/item3.xml><?xml version="1.0" encoding="utf-8"?>
 <ct:contentTypeSchema xmlns:ct="http://schemas.microsoft.com/office/2006/metadata/contentType" xmlns:ma="http://schemas.microsoft.com/office/2006/metadata/properties/metaAttributes" ct:_="" ma:_="" ma:contentTypeName="Document" ma:contentTypeID="0x0101000812F700BE7F874999720E88173FE491" ma:contentTypeVersion="0" ma:contentTypeDescription="Create a new document." ma:contentTypeScope="" ma:versionID="3f79f408e2ca720b7aba6e0e32464d0c">
   <xsd:schema xmlns:xsd="http://www.w3.org/2001/XMLSchema" xmlns:xs="http://www.w3.org/2001/XMLSchema" xmlns:p="http://schemas.microsoft.com/office/2006/metadata/properties" xmlns:ns2="7bb5d761-a2ea-4873-95f7-7a6658fb3ef0" targetNamespace="http://schemas.microsoft.com/office/2006/metadata/properties" ma:root="true" ma:fieldsID="1e062cd38ba31e406bfc4340fbc7f87a" ns2:_="">
     <xsd:import namespace="7bb5d761-a2ea-4873-95f7-7a6658fb3ef0"/>
@@ -12997,35 +12954,78 @@
 </ct:contentTypeSchema>
 </file>
 
+<file path=customXml/item3.xml><?xml version="1.0" encoding="utf-8"?>
+<?mso-contentType ?>
+<spe:Receivers xmlns:spe="http://schemas.microsoft.com/sharepoint/events">
+  <Receiver>
+    <Name>Document ID Generator</Name>
+    <Synchronization>Synchronous</Synchronization>
+    <Type>10001</Type>
+    <SequenceNumber>1000</SequenceNumber>
+    <Assembly>Microsoft.Office.DocumentManagement, Version=14.0.0.0, Culture=neutral, PublicKeyToken=71e9bce111e9429c</Assembly>
+    <Class>Microsoft.Office.DocumentManagement.Internal.DocIdHandler</Class>
+    <Data/>
+    <Filter/>
+  </Receiver>
+  <Receiver>
+    <Name>Document ID Generator</Name>
+    <Synchronization>Synchronous</Synchronization>
+    <Type>10002</Type>
+    <SequenceNumber>1001</SequenceNumber>
+    <Assembly>Microsoft.Office.DocumentManagement, Version=14.0.0.0, Culture=neutral, PublicKeyToken=71e9bce111e9429c</Assembly>
+    <Class>Microsoft.Office.DocumentManagement.Internal.DocIdHandler</Class>
+    <Data/>
+    <Filter/>
+  </Receiver>
+  <Receiver>
+    <Name>Document ID Generator</Name>
+    <Synchronization>Synchronous</Synchronization>
+    <Type>10004</Type>
+    <SequenceNumber>1002</SequenceNumber>
+    <Assembly>Microsoft.Office.DocumentManagement, Version=14.0.0.0, Culture=neutral, PublicKeyToken=71e9bce111e9429c</Assembly>
+    <Class>Microsoft.Office.DocumentManagement.Internal.DocIdHandler</Class>
+    <Data/>
+    <Filter/>
+  </Receiver>
+  <Receiver>
+    <Name>Document ID Generator</Name>
+    <Synchronization>Synchronous</Synchronization>
+    <Type>10006</Type>
+    <SequenceNumber>1003</SequenceNumber>
+    <Assembly>Microsoft.Office.DocumentManagement, Version=14.0.0.0, Culture=neutral, PublicKeyToken=71e9bce111e9429c</Assembly>
+    <Class>Microsoft.Office.DocumentManagement.Internal.DocIdHandler</Class>
+    <Data/>
+    <Filter/>
+  </Receiver>
+</spe:Receivers>
+</file>
+
 <file path=customXml/item4.xml><?xml version="1.0" encoding="utf-8"?>
-<p:properties xmlns:p="http://schemas.microsoft.com/office/2006/metadata/properties" xmlns:xsi="http://www.w3.org/2001/XMLSchema-instance" xmlns:pc="http://schemas.microsoft.com/office/infopath/2007/PartnerControls">
-  <documentManagement>
-    <_dlc_DocId xmlns="7bb5d761-a2ea-4873-95f7-7a6658fb3ef0">M4CWTKMW727E-592-73</_dlc_DocId>
-    <_dlc_DocIdUrl xmlns="7bb5d761-a2ea-4873-95f7-7a6658fb3ef0">
-      <Url>https://kms.vci.local/marketing/team/_layouts/DocIdRedir.aspx?ID=M4CWTKMW727E-592-73</Url>
-      <Description>M4CWTKMW727E-592-73</Description>
-    </_dlc_DocIdUrl>
-  </documentManagement>
-</p:properties>
+<?mso-contentType ?>
+<FormTemplates xmlns="http://schemas.microsoft.com/sharepoint/v3/contenttype/forms">
+  <Display>DocumentLibraryForm</Display>
+  <Edit>DocumentLibraryForm</Edit>
+  <New>DocumentLibraryForm</New>
+</FormTemplates>
 </file>
 
 <file path=customXml/itemProps1.xml><?xml version="1.0" encoding="utf-8"?>
-<ds:datastoreItem xmlns:ds="http://schemas.openxmlformats.org/officeDocument/2006/customXml" ds:itemID="{5CDEB364-43EC-4510-9881-539C2A3FCE9E}">
+<ds:datastoreItem xmlns:ds="http://schemas.openxmlformats.org/officeDocument/2006/customXml" ds:itemID="{6921749B-AEB7-461B-845F-603CABD25259}">
   <ds:schemaRefs>
-    <ds:schemaRef ds:uri="http://schemas.microsoft.com/sharepoint/v3/contenttype/forms"/>
+    <ds:schemaRef ds:uri="7bb5d761-a2ea-4873-95f7-7a6658fb3ef0"/>
+    <ds:schemaRef ds:uri="http://purl.org/dc/terms/"/>
+    <ds:schemaRef ds:uri="http://schemas.openxmlformats.org/package/2006/metadata/core-properties"/>
+    <ds:schemaRef ds:uri="http://purl.org/dc/dcmitype/"/>
+    <ds:schemaRef ds:uri="http://schemas.microsoft.com/office/infopath/2007/PartnerControls"/>
+    <ds:schemaRef ds:uri="http://schemas.microsoft.com/office/2006/documentManagement/types"/>
+    <ds:schemaRef ds:uri="http://purl.org/dc/elements/1.1/"/>
+    <ds:schemaRef ds:uri="http://schemas.microsoft.com/office/2006/metadata/properties"/>
+    <ds:schemaRef ds:uri="http://www.w3.org/XML/1998/namespace"/>
   </ds:schemaRefs>
 </ds:datastoreItem>
 </file>
 
 <file path=customXml/itemProps2.xml><?xml version="1.0" encoding="utf-8"?>
-<ds:datastoreItem xmlns:ds="http://schemas.openxmlformats.org/officeDocument/2006/customXml" ds:itemID="{B13EBC30-FE27-4C6A-B723-23FC2188F7DC}">
-  <ds:schemaRefs>
-    <ds:schemaRef ds:uri="http://schemas.microsoft.com/sharepoint/events"/>
-  </ds:schemaRefs>
-</ds:datastoreItem>
-</file>
-
-<file path=customXml/itemProps3.xml><?xml version="1.0" encoding="utf-8"?>
 <ds:datastoreItem xmlns:ds="http://schemas.openxmlformats.org/officeDocument/2006/customXml" ds:itemID="{164479E5-0B02-49AC-B79E-EC1D6164DDD3}">
   <ds:schemaRefs>
     <ds:schemaRef ds:uri="http://schemas.microsoft.com/office/2006/metadata/contentType"/>
@@ -13043,18 +13043,18 @@
 </ds:datastoreItem>
 </file>
 
+<file path=customXml/itemProps3.xml><?xml version="1.0" encoding="utf-8"?>
+<ds:datastoreItem xmlns:ds="http://schemas.openxmlformats.org/officeDocument/2006/customXml" ds:itemID="{B13EBC30-FE27-4C6A-B723-23FC2188F7DC}">
+  <ds:schemaRefs>
+    <ds:schemaRef ds:uri="http://schemas.microsoft.com/sharepoint/events"/>
+  </ds:schemaRefs>
+</ds:datastoreItem>
+</file>
+
 <file path=customXml/itemProps4.xml><?xml version="1.0" encoding="utf-8"?>
-<ds:datastoreItem xmlns:ds="http://schemas.openxmlformats.org/officeDocument/2006/customXml" ds:itemID="{6921749B-AEB7-461B-845F-603CABD25259}">
+<ds:datastoreItem xmlns:ds="http://schemas.openxmlformats.org/officeDocument/2006/customXml" ds:itemID="{5CDEB364-43EC-4510-9881-539C2A3FCE9E}">
   <ds:schemaRefs>
-    <ds:schemaRef ds:uri="7bb5d761-a2ea-4873-95f7-7a6658fb3ef0"/>
-    <ds:schemaRef ds:uri="http://purl.org/dc/terms/"/>
-    <ds:schemaRef ds:uri="http://schemas.openxmlformats.org/package/2006/metadata/core-properties"/>
-    <ds:schemaRef ds:uri="http://purl.org/dc/dcmitype/"/>
-    <ds:schemaRef ds:uri="http://schemas.microsoft.com/office/infopath/2007/PartnerControls"/>
-    <ds:schemaRef ds:uri="http://schemas.microsoft.com/office/2006/documentManagement/types"/>
-    <ds:schemaRef ds:uri="http://purl.org/dc/elements/1.1/"/>
-    <ds:schemaRef ds:uri="http://schemas.microsoft.com/office/2006/metadata/properties"/>
-    <ds:schemaRef ds:uri="http://www.w3.org/XML/1998/namespace"/>
+    <ds:schemaRef ds:uri="http://schemas.microsoft.com/sharepoint/v3/contenttype/forms"/>
   </ds:schemaRefs>
 </ds:datastoreItem>
 </file>
</xml_diff>